<commit_message>
Updaten interactie met commentaar bij slides
</commit_message>
<xml_diff>
--- a/opdrachten/issuu.pptx
+++ b/opdrachten/issuu.pptx
@@ -10,7 +10,6 @@
     <p:sldId id="259" r:id="rId4"/>
     <p:sldId id="260" r:id="rId5"/>
     <p:sldId id="261" r:id="rId6"/>
-    <p:sldId id="262" r:id="rId7"/>
   </p:sldIdLst>
   <p:sldSz cx="12192000" cy="6858000"/>
   <p:notesSz cx="6858000" cy="9144000"/>
@@ -839,7 +838,7 @@
           <a:p>
             <a:fld id="{27D2A2FF-E35A-437B-9986-A330BCD26CB1}" type="datetimeFigureOut">
               <a:rPr lang="nl-NL" smtClean="0"/>
-              <a:t>18-2-2016</a:t>
+              <a:t>19-2-2016</a:t>
             </a:fld>
             <a:endParaRPr lang="nl-NL"/>
           </a:p>
@@ -1090,7 +1089,7 @@
           <a:p>
             <a:fld id="{27D2A2FF-E35A-437B-9986-A330BCD26CB1}" type="datetimeFigureOut">
               <a:rPr lang="nl-NL" smtClean="0"/>
-              <a:t>18-2-2016</a:t>
+              <a:t>19-2-2016</a:t>
             </a:fld>
             <a:endParaRPr lang="nl-NL"/>
           </a:p>
@@ -1404,7 +1403,7 @@
           <a:p>
             <a:fld id="{27D2A2FF-E35A-437B-9986-A330BCD26CB1}" type="datetimeFigureOut">
               <a:rPr lang="nl-NL" smtClean="0"/>
-              <a:t>18-2-2016</a:t>
+              <a:t>19-2-2016</a:t>
             </a:fld>
             <a:endParaRPr lang="nl-NL"/>
           </a:p>
@@ -1745,7 +1744,7 @@
           <a:p>
             <a:fld id="{27D2A2FF-E35A-437B-9986-A330BCD26CB1}" type="datetimeFigureOut">
               <a:rPr lang="nl-NL" smtClean="0"/>
-              <a:t>18-2-2016</a:t>
+              <a:t>19-2-2016</a:t>
             </a:fld>
             <a:endParaRPr lang="nl-NL"/>
           </a:p>
@@ -2059,7 +2058,7 @@
           <a:p>
             <a:fld id="{27D2A2FF-E35A-437B-9986-A330BCD26CB1}" type="datetimeFigureOut">
               <a:rPr lang="nl-NL" smtClean="0"/>
-              <a:t>18-2-2016</a:t>
+              <a:t>19-2-2016</a:t>
             </a:fld>
             <a:endParaRPr lang="nl-NL"/>
           </a:p>
@@ -2452,7 +2451,7 @@
           <a:p>
             <a:fld id="{27D2A2FF-E35A-437B-9986-A330BCD26CB1}" type="datetimeFigureOut">
               <a:rPr lang="nl-NL" smtClean="0"/>
-              <a:t>18-2-2016</a:t>
+              <a:t>19-2-2016</a:t>
             </a:fld>
             <a:endParaRPr lang="nl-NL"/>
           </a:p>
@@ -2622,7 +2621,7 @@
           <a:p>
             <a:fld id="{27D2A2FF-E35A-437B-9986-A330BCD26CB1}" type="datetimeFigureOut">
               <a:rPr lang="nl-NL" smtClean="0"/>
-              <a:t>18-2-2016</a:t>
+              <a:t>19-2-2016</a:t>
             </a:fld>
             <a:endParaRPr lang="nl-NL"/>
           </a:p>
@@ -2802,7 +2801,7 @@
           <a:p>
             <a:fld id="{27D2A2FF-E35A-437B-9986-A330BCD26CB1}" type="datetimeFigureOut">
               <a:rPr lang="nl-NL" smtClean="0"/>
-              <a:t>18-2-2016</a:t>
+              <a:t>19-2-2016</a:t>
             </a:fld>
             <a:endParaRPr lang="nl-NL"/>
           </a:p>
@@ -2978,7 +2977,7 @@
           <a:p>
             <a:fld id="{27D2A2FF-E35A-437B-9986-A330BCD26CB1}" type="datetimeFigureOut">
               <a:rPr lang="nl-NL" smtClean="0"/>
-              <a:t>18-2-2016</a:t>
+              <a:t>19-2-2016</a:t>
             </a:fld>
             <a:endParaRPr lang="nl-NL"/>
           </a:p>
@@ -3225,7 +3224,7 @@
           <a:p>
             <a:fld id="{27D2A2FF-E35A-437B-9986-A330BCD26CB1}" type="datetimeFigureOut">
               <a:rPr lang="nl-NL" smtClean="0"/>
-              <a:t>18-2-2016</a:t>
+              <a:t>19-2-2016</a:t>
             </a:fld>
             <a:endParaRPr lang="nl-NL"/>
           </a:p>
@@ -3457,7 +3456,7 @@
           <a:p>
             <a:fld id="{27D2A2FF-E35A-437B-9986-A330BCD26CB1}" type="datetimeFigureOut">
               <a:rPr lang="nl-NL" smtClean="0"/>
-              <a:t>18-2-2016</a:t>
+              <a:t>19-2-2016</a:t>
             </a:fld>
             <a:endParaRPr lang="nl-NL"/>
           </a:p>
@@ -3831,7 +3830,7 @@
           <a:p>
             <a:fld id="{27D2A2FF-E35A-437B-9986-A330BCD26CB1}" type="datetimeFigureOut">
               <a:rPr lang="nl-NL" smtClean="0"/>
-              <a:t>18-2-2016</a:t>
+              <a:t>19-2-2016</a:t>
             </a:fld>
             <a:endParaRPr lang="nl-NL"/>
           </a:p>
@@ -3954,7 +3953,7 @@
           <a:p>
             <a:fld id="{27D2A2FF-E35A-437B-9986-A330BCD26CB1}" type="datetimeFigureOut">
               <a:rPr lang="nl-NL" smtClean="0"/>
-              <a:t>18-2-2016</a:t>
+              <a:t>19-2-2016</a:t>
             </a:fld>
             <a:endParaRPr lang="nl-NL"/>
           </a:p>
@@ -4049,7 +4048,7 @@
           <a:p>
             <a:fld id="{27D2A2FF-E35A-437B-9986-A330BCD26CB1}" type="datetimeFigureOut">
               <a:rPr lang="nl-NL" smtClean="0"/>
-              <a:t>18-2-2016</a:t>
+              <a:t>19-2-2016</a:t>
             </a:fld>
             <a:endParaRPr lang="nl-NL"/>
           </a:p>
@@ -4304,7 +4303,7 @@
           <a:p>
             <a:fld id="{27D2A2FF-E35A-437B-9986-A330BCD26CB1}" type="datetimeFigureOut">
               <a:rPr lang="nl-NL" smtClean="0"/>
-              <a:t>18-2-2016</a:t>
+              <a:t>19-2-2016</a:t>
             </a:fld>
             <a:endParaRPr lang="nl-NL"/>
           </a:p>
@@ -4567,7 +4566,7 @@
           <a:p>
             <a:fld id="{27D2A2FF-E35A-437B-9986-A330BCD26CB1}" type="datetimeFigureOut">
               <a:rPr lang="nl-NL" smtClean="0"/>
-              <a:t>18-2-2016</a:t>
+              <a:t>19-2-2016</a:t>
             </a:fld>
             <a:endParaRPr lang="nl-NL"/>
           </a:p>
@@ -5310,7 +5309,7 @@
           <a:p>
             <a:fld id="{27D2A2FF-E35A-437B-9986-A330BCD26CB1}" type="datetimeFigureOut">
               <a:rPr lang="nl-NL" smtClean="0"/>
-              <a:t>18-2-2016</a:t>
+              <a:t>19-2-2016</a:t>
             </a:fld>
             <a:endParaRPr lang="nl-NL"/>
           </a:p>
@@ -6634,147 +6633,6 @@
 </p:sld>
 </file>
 
-<file path=ppt/slides/slide6.xml><?xml version="1.0" encoding="utf-8"?>
-<p:sld xmlns:a="http://schemas.openxmlformats.org/drawingml/2006/main" xmlns:r="http://schemas.openxmlformats.org/officeDocument/2006/relationships" xmlns:p="http://schemas.openxmlformats.org/presentationml/2006/main">
-  <p:cSld>
-    <p:spTree>
-      <p:nvGrpSpPr>
-        <p:cNvPr id="1" name=""/>
-        <p:cNvGrpSpPr/>
-        <p:nvPr/>
-      </p:nvGrpSpPr>
-      <p:grpSpPr>
-        <a:xfrm>
-          <a:off x="0" y="0"/>
-          <a:ext cx="0" cy="0"/>
-          <a:chOff x="0" y="0"/>
-          <a:chExt cx="0" cy="0"/>
-        </a:xfrm>
-      </p:grpSpPr>
-      <p:sp>
-        <p:nvSpPr>
-          <p:cNvPr id="2" name="Titel 1"/>
-          <p:cNvSpPr>
-            <a:spLocks noGrp="1"/>
-          </p:cNvSpPr>
-          <p:nvPr>
-            <p:ph type="title"/>
-          </p:nvPr>
-        </p:nvSpPr>
-        <p:spPr/>
-        <p:txBody>
-          <a:bodyPr/>
-          <a:lstStyle/>
-          <a:p>
-            <a:pPr algn="ctr"/>
-            <a:r>
-              <a:rPr lang="en-US" dirty="0" err="1" smtClean="0"/>
-              <a:t>Conclu</a:t>
-            </a:r>
-            <a:r>
-              <a:rPr lang="en-US" sz="4000" dirty="0" err="1" smtClean="0"/>
-              <a:t>sie</a:t>
-            </a:r>
-            <a:endParaRPr lang="nl-NL" sz="4000" dirty="0"/>
-          </a:p>
-        </p:txBody>
-      </p:sp>
-      <p:sp>
-        <p:nvSpPr>
-          <p:cNvPr id="3" name="Tijdelijke aanduiding voor inhoud 2"/>
-          <p:cNvSpPr>
-            <a:spLocks noGrp="1"/>
-          </p:cNvSpPr>
-          <p:nvPr>
-            <p:ph idx="1"/>
-          </p:nvPr>
-        </p:nvSpPr>
-        <p:spPr/>
-        <p:txBody>
-          <a:bodyPr/>
-          <a:lstStyle/>
-          <a:p>
-            <a:r>
-              <a:rPr lang="en-US" dirty="0" err="1" smtClean="0"/>
-              <a:t>Goede</a:t>
-            </a:r>
-            <a:r>
-              <a:rPr lang="en-US" dirty="0" smtClean="0"/>
-              <a:t> site</a:t>
-            </a:r>
-          </a:p>
-          <a:p>
-            <a:r>
-              <a:rPr lang="en-US" dirty="0" err="1" smtClean="0"/>
-              <a:t>Kleine</a:t>
-            </a:r>
-            <a:r>
-              <a:rPr lang="en-US" dirty="0" smtClean="0"/>
-              <a:t> </a:t>
-            </a:r>
-            <a:r>
-              <a:rPr lang="en-US" dirty="0" err="1" smtClean="0"/>
-              <a:t>aanpassingen</a:t>
-            </a:r>
-            <a:r>
-              <a:rPr lang="en-US" dirty="0"/>
-              <a:t> </a:t>
-            </a:r>
-            <a:r>
-              <a:rPr lang="en-US" dirty="0" err="1" smtClean="0"/>
-              <a:t>voor</a:t>
-            </a:r>
-            <a:r>
-              <a:rPr lang="en-US" dirty="0" smtClean="0"/>
-              <a:t> </a:t>
-            </a:r>
-            <a:r>
-              <a:rPr lang="en-US" dirty="0" err="1" smtClean="0"/>
-              <a:t>betere</a:t>
-            </a:r>
-            <a:r>
-              <a:rPr lang="en-US" dirty="0" smtClean="0"/>
-              <a:t> </a:t>
-            </a:r>
-            <a:r>
-              <a:rPr lang="en-US" dirty="0" err="1" smtClean="0"/>
-              <a:t>sociale</a:t>
-            </a:r>
-            <a:r>
-              <a:rPr lang="en-US" dirty="0" smtClean="0"/>
-              <a:t> </a:t>
-            </a:r>
-            <a:r>
-              <a:rPr lang="en-US" dirty="0" err="1" smtClean="0"/>
-              <a:t>interactie</a:t>
-            </a:r>
-            <a:endParaRPr lang="en-US" dirty="0" smtClean="0"/>
-          </a:p>
-          <a:p>
-            <a:endParaRPr lang="nl-NL" dirty="0"/>
-          </a:p>
-        </p:txBody>
-      </p:sp>
-    </p:spTree>
-    <p:extLst>
-      <p:ext uri="{BB962C8B-B14F-4D97-AF65-F5344CB8AC3E}">
-        <p14:creationId xmlns:p14="http://schemas.microsoft.com/office/powerpoint/2010/main" val="1113992637"/>
-      </p:ext>
-    </p:extLst>
-  </p:cSld>
-  <p:clrMapOvr>
-    <a:masterClrMapping/>
-  </p:clrMapOvr>
-  <p:timing>
-    <p:tnLst>
-      <p:par>
-        <p:cTn id="1" dur="indefinite" restart="never" nodeType="tmRoot"/>
-      </p:par>
-    </p:tnLst>
-  </p:timing>
-</p:sld>
-</file>
-
 <file path=ppt/theme/theme1.xml><?xml version="1.0" encoding="utf-8"?>
 <a:theme xmlns:a="http://schemas.openxmlformats.org/drawingml/2006/main" name="Facet">
   <a:themeElements>

</xml_diff>